<commit_message>
Update slides for week6
</commit_message>
<xml_diff>
--- a/WeeklyStatusUpdates/Week6.pptx
+++ b/WeeklyStatusUpdates/Week6.pptx
@@ -200,7 +200,7 @@
           <a:p>
             <a:fld id="{7CD6169F-F0AF-4286-96F8-88590B5964A8}" type="datetimeFigureOut">
               <a:rPr lang="en-US" smtClean="0"/>
-              <a:t>10/6/2014</a:t>
+              <a:t>10/7/2014</a:t>
             </a:fld>
             <a:endParaRPr lang="en-US"/>
           </a:p>
@@ -1093,7 +1093,7 @@
           <a:p>
             <a:fld id="{B8163F50-262D-4B06-B660-EF805F49E910}" type="datetime1">
               <a:rPr lang="en-US" smtClean="0"/>
-              <a:t>10/6/2014</a:t>
+              <a:t>10/7/2014</a:t>
             </a:fld>
             <a:endParaRPr lang="en-US"/>
           </a:p>
@@ -1293,7 +1293,7 @@
           <a:p>
             <a:fld id="{4DA6DD54-5D4C-4CC9-966B-61A5CED87253}" type="datetime1">
               <a:rPr lang="en-US" smtClean="0"/>
-              <a:t>10/6/2014</a:t>
+              <a:t>10/7/2014</a:t>
             </a:fld>
             <a:endParaRPr lang="en-US"/>
           </a:p>
@@ -1482,7 +1482,7 @@
           <a:p>
             <a:fld id="{2DEBF465-7077-46BD-A071-1EF5F17C0541}" type="datetime1">
               <a:rPr lang="en-US" smtClean="0"/>
-              <a:t>10/6/2014</a:t>
+              <a:t>10/7/2014</a:t>
             </a:fld>
             <a:endParaRPr lang="en-US"/>
           </a:p>
@@ -1636,7 +1636,7 @@
           <a:p>
             <a:fld id="{30C3620B-49FF-42BA-8B9D-E349AA598DD5}" type="datetime1">
               <a:rPr lang="en-US" smtClean="0"/>
-              <a:t>10/6/2014</a:t>
+              <a:t>10/7/2014</a:t>
             </a:fld>
             <a:endParaRPr lang="en-US"/>
           </a:p>
@@ -1895,7 +1895,7 @@
           <a:p>
             <a:fld id="{E344C5BE-35B1-4E40-8B90-0836222554B2}" type="datetime1">
               <a:rPr lang="en-US" smtClean="0"/>
-              <a:t>10/6/2014</a:t>
+              <a:t>10/7/2014</a:t>
             </a:fld>
             <a:endParaRPr lang="en-US"/>
           </a:p>
@@ -2308,7 +2308,7 @@
           <a:p>
             <a:fld id="{F0DC8DA7-4745-40EF-8E8F-A0221A3D5B8B}" type="datetime1">
               <a:rPr lang="en-US" smtClean="0"/>
-              <a:t>10/6/2014</a:t>
+              <a:t>10/7/2014</a:t>
             </a:fld>
             <a:endParaRPr lang="en-US"/>
           </a:p>
@@ -2758,7 +2758,7 @@
           <a:p>
             <a:fld id="{8BD96BC2-EF5E-425B-8A71-6CC6666F9951}" type="datetime1">
               <a:rPr lang="en-US" smtClean="0"/>
-              <a:t>10/6/2014</a:t>
+              <a:t>10/7/2014</a:t>
             </a:fld>
             <a:endParaRPr lang="en-US"/>
           </a:p>
@@ -2863,7 +2863,7 @@
           <a:p>
             <a:fld id="{EE3C036B-71A3-4422-8869-D94017AC4E54}" type="datetime1">
               <a:rPr lang="en-US" smtClean="0"/>
-              <a:t>10/6/2014</a:t>
+              <a:t>10/7/2014</a:t>
             </a:fld>
             <a:endParaRPr lang="en-US"/>
           </a:p>
@@ -2988,7 +2988,7 @@
           <a:p>
             <a:fld id="{A3B163F8-C4AA-4C14-8593-6AEE28E6B6A7}" type="datetime1">
               <a:rPr lang="en-US" smtClean="0"/>
-              <a:t>10/6/2014</a:t>
+              <a:t>10/7/2014</a:t>
             </a:fld>
             <a:endParaRPr lang="en-US"/>
           </a:p>
@@ -3266,7 +3266,7 @@
           <a:p>
             <a:fld id="{6E686D7C-8298-4B23-B3C3-41A4DFCC5255}" type="datetime1">
               <a:rPr lang="en-US" smtClean="0"/>
-              <a:t>10/6/2014</a:t>
+              <a:t>10/7/2014</a:t>
             </a:fld>
             <a:endParaRPr lang="en-US"/>
           </a:p>
@@ -3475,7 +3475,7 @@
           <a:p>
             <a:fld id="{74796CA7-CA7C-416E-96A9-F5E73F5E7765}" type="datetime1">
               <a:rPr lang="en-US" smtClean="0"/>
-              <a:t>10/6/2014</a:t>
+              <a:t>10/7/2014</a:t>
             </a:fld>
             <a:endParaRPr lang="en-US"/>
           </a:p>
@@ -4588,7 +4588,7 @@
           <a:p>
             <a:fld id="{84E90C87-5559-42B0-9092-0B082508F0B4}" type="datetime1">
               <a:rPr lang="en-US" smtClean="0"/>
-              <a:t>10/6/2014</a:t>
+              <a:t>10/7/2014</a:t>
             </a:fld>
             <a:endParaRPr lang="en-US"/>
           </a:p>
@@ -5108,7 +5108,7 @@
           <a:p>
             <a:fld id="{0E7C172B-DE23-4453-B770-154399521D93}" type="datetime1">
               <a:rPr lang="en-US" smtClean="0"/>
-              <a:t>10/6/2014</a:t>
+              <a:t>10/7/2014</a:t>
             </a:fld>
             <a:endParaRPr lang="en-US"/>
           </a:p>
@@ -5170,6 +5170,13 @@
   <p:clrMapOvr>
     <a:masterClrMapping/>
   </p:clrMapOvr>
+  <p:timing>
+    <p:tnLst>
+      <p:par>
+        <p:cTn id="1" dur="indefinite" restart="never" nodeType="tmRoot"/>
+      </p:par>
+    </p:tnLst>
+  </p:timing>
 </p:sld>
 </file>
 
@@ -5260,7 +5267,7 @@
           <a:p>
             <a:fld id="{30C3620B-49FF-42BA-8B9D-E349AA598DD5}" type="datetime1">
               <a:rPr lang="en-US" smtClean="0"/>
-              <a:t>10/6/2014</a:t>
+              <a:t>10/7/2014</a:t>
             </a:fld>
             <a:endParaRPr lang="en-US"/>
           </a:p>
@@ -5335,6 +5342,63 @@
           </a:p>
         </p:txBody>
       </p:sp>
+      <p:graphicFrame>
+        <p:nvGraphicFramePr>
+          <p:cNvPr id="7" name="Object 6"/>
+          <p:cNvGraphicFramePr>
+            <a:graphicFrameLocks noChangeAspect="1"/>
+          </p:cNvGraphicFramePr>
+          <p:nvPr>
+            <p:extLst>
+              <p:ext uri="{D42A27DB-BD31-4B8C-83A1-F6EECF244321}">
+                <p14:modId xmlns:p14="http://schemas.microsoft.com/office/powerpoint/2010/main" val="2450735119"/>
+              </p:ext>
+            </p:extLst>
+          </p:nvPr>
+        </p:nvGraphicFramePr>
+        <p:xfrm>
+          <a:off x="6400800" y="5410200"/>
+          <a:ext cx="2424113" cy="863600"/>
+        </p:xfrm>
+        <a:graphic>
+          <a:graphicData uri="http://schemas.openxmlformats.org/presentationml/2006/ole">
+            <mc:AlternateContent xmlns:mc="http://schemas.openxmlformats.org/markup-compatibility/2006">
+              <mc:Choice xmlns:v="urn:schemas-microsoft-com:vml" Requires="v">
+                <p:oleObj spid="_x0000_s1027" name="Packager Shell Object" showAsIcon="1" r:id="rId3" imgW="2424600" imgH="863640" progId="Package">
+                  <p:embed/>
+                </p:oleObj>
+              </mc:Choice>
+              <mc:Fallback>
+                <p:oleObj name="Packager Shell Object" showAsIcon="1" r:id="rId3" imgW="2424600" imgH="863640" progId="Package">
+                  <p:embed/>
+                  <p:pic>
+                    <p:nvPicPr>
+                      <p:cNvPr id="0" name=""/>
+                      <p:cNvPicPr/>
+                      <p:nvPr/>
+                    </p:nvPicPr>
+                    <p:blipFill>
+                      <a:blip r:embed="rId4"/>
+                      <a:stretch>
+                        <a:fillRect/>
+                      </a:stretch>
+                    </p:blipFill>
+                    <p:spPr>
+                      <a:xfrm>
+                        <a:off x="6400800" y="5410200"/>
+                        <a:ext cx="2424113" cy="863600"/>
+                      </a:xfrm>
+                      <a:prstGeom prst="rect">
+                        <a:avLst/>
+                      </a:prstGeom>
+                    </p:spPr>
+                  </p:pic>
+                </p:oleObj>
+              </mc:Fallback>
+            </mc:AlternateContent>
+          </a:graphicData>
+        </a:graphic>
+      </p:graphicFrame>
     </p:spTree>
     <p:extLst>
       <p:ext uri="{BB962C8B-B14F-4D97-AF65-F5344CB8AC3E}">
@@ -5345,6 +5409,13 @@
   <p:clrMapOvr>
     <a:masterClrMapping/>
   </p:clrMapOvr>
+  <p:timing>
+    <p:tnLst>
+      <p:par>
+        <p:cTn id="1" dur="indefinite" restart="never" nodeType="tmRoot"/>
+      </p:par>
+    </p:tnLst>
+  </p:timing>
 </p:sld>
 </file>
 
@@ -5463,7 +5534,7 @@
           <a:p>
             <a:fld id="{30C3620B-49FF-42BA-8B9D-E349AA598DD5}" type="datetime1">
               <a:rPr lang="en-US" smtClean="0"/>
-              <a:t>10/6/2014</a:t>
+              <a:t>10/7/2014</a:t>
             </a:fld>
             <a:endParaRPr lang="en-US"/>
           </a:p>
@@ -5548,6 +5619,13 @@
   <p:clrMapOvr>
     <a:masterClrMapping/>
   </p:clrMapOvr>
+  <p:timing>
+    <p:tnLst>
+      <p:par>
+        <p:cTn id="1" dur="indefinite" restart="never" nodeType="tmRoot"/>
+      </p:par>
+    </p:tnLst>
+  </p:timing>
 </p:sld>
 </file>
 
@@ -5676,7 +5754,7 @@
           <a:p>
             <a:fld id="{30C3620B-49FF-42BA-8B9D-E349AA598DD5}" type="datetime1">
               <a:rPr lang="en-US" smtClean="0"/>
-              <a:t>10/6/2014</a:t>
+              <a:t>10/7/2014</a:t>
             </a:fld>
             <a:endParaRPr lang="en-US"/>
           </a:p>
@@ -5773,6 +5851,13 @@
   <p:clrMapOvr>
     <a:masterClrMapping/>
   </p:clrMapOvr>
+  <p:timing>
+    <p:tnLst>
+      <p:par>
+        <p:cTn id="1" dur="indefinite" restart="never" nodeType="tmRoot"/>
+      </p:par>
+    </p:tnLst>
+  </p:timing>
 </p:sld>
 </file>
 
@@ -5850,7 +5935,7 @@
           <a:p>
             <a:fld id="{30C3620B-49FF-42BA-8B9D-E349AA598DD5}" type="datetime1">
               <a:rPr lang="en-US" smtClean="0"/>
-              <a:t>10/6/2014</a:t>
+              <a:t>10/7/2014</a:t>
             </a:fld>
             <a:endParaRPr lang="en-US"/>
           </a:p>
@@ -5935,6 +6020,13 @@
   <p:clrMapOvr>
     <a:masterClrMapping/>
   </p:clrMapOvr>
+  <p:timing>
+    <p:tnLst>
+      <p:par>
+        <p:cTn id="1" dur="indefinite" restart="never" nodeType="tmRoot"/>
+      </p:par>
+    </p:tnLst>
+  </p:timing>
 </p:sld>
 </file>
 
@@ -6023,7 +6115,7 @@
           <a:p>
             <a:fld id="{30C3620B-49FF-42BA-8B9D-E349AA598DD5}" type="datetime1">
               <a:rPr lang="en-US" smtClean="0"/>
-              <a:t>10/6/2014</a:t>
+              <a:t>10/7/2014</a:t>
             </a:fld>
             <a:endParaRPr lang="en-US"/>
           </a:p>
@@ -6108,6 +6200,13 @@
   <p:clrMapOvr>
     <a:masterClrMapping/>
   </p:clrMapOvr>
+  <p:timing>
+    <p:tnLst>
+      <p:par>
+        <p:cTn id="1" dur="indefinite" restart="never" nodeType="tmRoot"/>
+      </p:par>
+    </p:tnLst>
+  </p:timing>
 </p:sld>
 </file>
 
@@ -6275,7 +6374,7 @@
           <a:p>
             <a:fld id="{30C3620B-49FF-42BA-8B9D-E349AA598DD5}" type="datetime1">
               <a:rPr lang="en-US" smtClean="0"/>
-              <a:t>10/6/2014</a:t>
+              <a:t>10/7/2014</a:t>
             </a:fld>
             <a:endParaRPr lang="en-US"/>
           </a:p>
@@ -6488,7 +6587,7 @@
           <a:p>
             <a:fld id="{30C3620B-49FF-42BA-8B9D-E349AA598DD5}" type="datetime1">
               <a:rPr lang="en-US" smtClean="0"/>
-              <a:t>10/6/2014</a:t>
+              <a:t>10/7/2014</a:t>
             </a:fld>
             <a:endParaRPr lang="en-US"/>
           </a:p>
@@ -6645,7 +6744,7 @@
           <a:p>
             <a:fld id="{30C3620B-49FF-42BA-8B9D-E349AA598DD5}" type="datetime1">
               <a:rPr lang="en-US" smtClean="0"/>
-              <a:t>10/6/2014</a:t>
+              <a:t>10/7/2014</a:t>
             </a:fld>
             <a:endParaRPr lang="en-US"/>
           </a:p>

</xml_diff>